<commit_message>
Add documentation in project.
</commit_message>
<xml_diff>
--- a/Presentation/TeamHotaru.pptx
+++ b/Presentation/TeamHotaru.pptx
@@ -3291,15 +3291,23 @@
           <a:lstStyle/>
           <a:p>
             <a:r>
+              <a:rPr lang="en-US" i="1" dirty="0"/>
+              <a:t>2015 THE AIR BATTLE</a:t>
+            </a:r>
+            <a:r>
               <a:rPr lang="en-US" dirty="0" smtClean="0"/>
-              <a:t>AIR BATTLE 2014</a:t>
+              <a:t/>
             </a:r>
             <a:br>
               <a:rPr lang="en-US" dirty="0" smtClean="0"/>
             </a:br>
             <a:r>
               <a:rPr lang="en-US" dirty="0" smtClean="0"/>
-              <a:t>Game project</a:t>
+              <a:t>JS g</a:t>
+            </a:r>
+            <a:r>
+              <a:rPr lang="en-US" dirty="0" smtClean="0"/>
+              <a:t>ame</a:t>
             </a:r>
             <a:endParaRPr lang="en-US" dirty="0"/>
           </a:p>
@@ -3404,19 +3412,29 @@
           <a:p>
             <a:r>
               <a:rPr lang="en-US" dirty="0" smtClean="0"/>
-              <a:t>KineticJS for HTML5 Canvas</a:t>
-            </a:r>
-          </a:p>
-          <a:p>
-            <a:r>
-              <a:rPr lang="en-US" smtClean="0"/>
-              <a:t>Canvas </a:t>
-            </a:r>
-            <a:r>
-              <a:rPr lang="en-US" smtClean="0"/>
-              <a:t>and SVG animation</a:t>
+              <a:t>KineticJS for HTML5 </a:t>
+            </a:r>
+            <a:r>
+              <a:rPr lang="en-US" dirty="0" smtClean="0"/>
+              <a:t>Canvas</a:t>
+            </a:r>
+          </a:p>
+          <a:p>
+            <a:r>
+              <a:rPr lang="en-US" dirty="0"/>
+              <a:t>Raphael for SVG </a:t>
+            </a:r>
+            <a:r>
+              <a:rPr lang="en-US" dirty="0" smtClean="0"/>
+              <a:t>graphics</a:t>
             </a:r>
             <a:endParaRPr lang="en-US" dirty="0" smtClean="0"/>
+          </a:p>
+          <a:p>
+            <a:r>
+              <a:rPr lang="en-US" dirty="0" smtClean="0"/>
+              <a:t>Canvas and SVG animation</a:t>
+            </a:r>
           </a:p>
           <a:p>
             <a:r>
@@ -3427,17 +3445,11 @@
           <a:p>
             <a:r>
               <a:rPr lang="en-US" dirty="0" smtClean="0"/>
-              <a:t>JS OOP</a:t>
-            </a:r>
-          </a:p>
-          <a:p>
+              <a:t>JS </a:t>
+            </a:r>
             <a:r>
               <a:rPr lang="en-US" dirty="0" smtClean="0"/>
-              <a:t>Raphael for </a:t>
-            </a:r>
-            <a:r>
-              <a:rPr lang="en-US" dirty="0" smtClean="0"/>
-              <a:t>SVG graphics</a:t>
+              <a:t>OOP</a:t>
             </a:r>
             <a:endParaRPr lang="en-US" dirty="0" smtClean="0"/>
           </a:p>

</xml_diff>

<commit_message>
Add "thank you" slide
</commit_message>
<xml_diff>
--- a/Presentation/TeamHotaru.pptx
+++ b/Presentation/TeamHotaru.pptx
@@ -8,6 +8,7 @@
     <p:sldId id="256" r:id="rId2"/>
     <p:sldId id="257" r:id="rId3"/>
     <p:sldId id="258" r:id="rId4"/>
+    <p:sldId id="259" r:id="rId5"/>
   </p:sldIdLst>
   <p:sldSz cx="9144000" cy="6858000" type="screen4x3"/>
   <p:notesSz cx="6858000" cy="9144000"/>
@@ -290,7 +291,7 @@
           <a:p>
             <a:fld id="{851AF9FE-80D8-41DD-9A4F-61464DCBAE9A}" type="datetimeFigureOut">
               <a:rPr lang="en-US" smtClean="0"/>
-              <a:t>6/15/2014</a:t>
+              <a:t>6/18/2014</a:t>
             </a:fld>
             <a:endParaRPr lang="en-US"/>
           </a:p>
@@ -460,7 +461,7 @@
           <a:p>
             <a:fld id="{851AF9FE-80D8-41DD-9A4F-61464DCBAE9A}" type="datetimeFigureOut">
               <a:rPr lang="en-US" smtClean="0"/>
-              <a:t>6/15/2014</a:t>
+              <a:t>6/18/2014</a:t>
             </a:fld>
             <a:endParaRPr lang="en-US"/>
           </a:p>
@@ -640,7 +641,7 @@
           <a:p>
             <a:fld id="{851AF9FE-80D8-41DD-9A4F-61464DCBAE9A}" type="datetimeFigureOut">
               <a:rPr lang="en-US" smtClean="0"/>
-              <a:t>6/15/2014</a:t>
+              <a:t>6/18/2014</a:t>
             </a:fld>
             <a:endParaRPr lang="en-US"/>
           </a:p>
@@ -810,7 +811,7 @@
           <a:p>
             <a:fld id="{851AF9FE-80D8-41DD-9A4F-61464DCBAE9A}" type="datetimeFigureOut">
               <a:rPr lang="en-US" smtClean="0"/>
-              <a:t>6/15/2014</a:t>
+              <a:t>6/18/2014</a:t>
             </a:fld>
             <a:endParaRPr lang="en-US"/>
           </a:p>
@@ -1056,7 +1057,7 @@
           <a:p>
             <a:fld id="{851AF9FE-80D8-41DD-9A4F-61464DCBAE9A}" type="datetimeFigureOut">
               <a:rPr lang="en-US" smtClean="0"/>
-              <a:t>6/15/2014</a:t>
+              <a:t>6/18/2014</a:t>
             </a:fld>
             <a:endParaRPr lang="en-US"/>
           </a:p>
@@ -1344,7 +1345,7 @@
           <a:p>
             <a:fld id="{851AF9FE-80D8-41DD-9A4F-61464DCBAE9A}" type="datetimeFigureOut">
               <a:rPr lang="en-US" smtClean="0"/>
-              <a:t>6/15/2014</a:t>
+              <a:t>6/18/2014</a:t>
             </a:fld>
             <a:endParaRPr lang="en-US"/>
           </a:p>
@@ -1766,7 +1767,7 @@
           <a:p>
             <a:fld id="{851AF9FE-80D8-41DD-9A4F-61464DCBAE9A}" type="datetimeFigureOut">
               <a:rPr lang="en-US" smtClean="0"/>
-              <a:t>6/15/2014</a:t>
+              <a:t>6/18/2014</a:t>
             </a:fld>
             <a:endParaRPr lang="en-US"/>
           </a:p>
@@ -1884,7 +1885,7 @@
           <a:p>
             <a:fld id="{851AF9FE-80D8-41DD-9A4F-61464DCBAE9A}" type="datetimeFigureOut">
               <a:rPr lang="en-US" smtClean="0"/>
-              <a:t>6/15/2014</a:t>
+              <a:t>6/18/2014</a:t>
             </a:fld>
             <a:endParaRPr lang="en-US"/>
           </a:p>
@@ -1979,7 +1980,7 @@
           <a:p>
             <a:fld id="{851AF9FE-80D8-41DD-9A4F-61464DCBAE9A}" type="datetimeFigureOut">
               <a:rPr lang="en-US" smtClean="0"/>
-              <a:t>6/15/2014</a:t>
+              <a:t>6/18/2014</a:t>
             </a:fld>
             <a:endParaRPr lang="en-US"/>
           </a:p>
@@ -2256,7 +2257,7 @@
           <a:p>
             <a:fld id="{851AF9FE-80D8-41DD-9A4F-61464DCBAE9A}" type="datetimeFigureOut">
               <a:rPr lang="en-US" smtClean="0"/>
-              <a:t>6/15/2014</a:t>
+              <a:t>6/18/2014</a:t>
             </a:fld>
             <a:endParaRPr lang="en-US"/>
           </a:p>
@@ -2509,7 +2510,7 @@
           <a:p>
             <a:fld id="{851AF9FE-80D8-41DD-9A4F-61464DCBAE9A}" type="datetimeFigureOut">
               <a:rPr lang="en-US" smtClean="0"/>
-              <a:t>6/15/2014</a:t>
+              <a:t>6/18/2014</a:t>
             </a:fld>
             <a:endParaRPr lang="en-US"/>
           </a:p>
@@ -2727,7 +2728,7 @@
           <a:p>
             <a:fld id="{851AF9FE-80D8-41DD-9A4F-61464DCBAE9A}" type="datetimeFigureOut">
               <a:rPr lang="en-US" smtClean="0"/>
-              <a:t>6/15/2014</a:t>
+              <a:t>6/18/2014</a:t>
             </a:fld>
             <a:endParaRPr lang="en-US"/>
           </a:p>
@@ -3158,8 +3159,9 @@
             <a:r>
               <a:rPr lang="en-US" dirty="0" smtClean="0">
                 <a:solidFill>
-                  <a:schemeClr val="accent2">
+                  <a:schemeClr val="tx1">
                     <a:lumMod val="75000"/>
+                    <a:lumOff val="25000"/>
                   </a:schemeClr>
                 </a:solidFill>
               </a:rPr>
@@ -3170,8 +3172,9 @@
             <a:r>
               <a:rPr lang="bg-BG" b="1" dirty="0" smtClean="0">
                 <a:solidFill>
-                  <a:schemeClr val="accent2">
+                  <a:schemeClr val="tx1">
                     <a:lumMod val="75000"/>
+                    <a:lumOff val="25000"/>
                   </a:schemeClr>
                 </a:solidFill>
               </a:rPr>
@@ -3182,8 +3185,9 @@
             <a:r>
               <a:rPr lang="bg-BG" b="1" dirty="0" smtClean="0">
                 <a:solidFill>
-                  <a:schemeClr val="accent2">
+                  <a:schemeClr val="tx1">
                     <a:lumMod val="75000"/>
+                    <a:lumOff val="25000"/>
                   </a:schemeClr>
                 </a:solidFill>
               </a:rPr>
@@ -3194,8 +3198,9 @@
             <a:r>
               <a:rPr lang="bg-BG" b="1" dirty="0" smtClean="0">
                 <a:solidFill>
-                  <a:schemeClr val="accent2">
+                  <a:schemeClr val="tx1">
                     <a:lumMod val="75000"/>
+                    <a:lumOff val="25000"/>
                   </a:schemeClr>
                 </a:solidFill>
               </a:rPr>
@@ -3206,8 +3211,9 @@
             <a:r>
               <a:rPr lang="bg-BG" b="1" dirty="0" smtClean="0">
                 <a:solidFill>
-                  <a:schemeClr val="accent2">
+                  <a:schemeClr val="tx1">
                     <a:lumMod val="75000"/>
+                    <a:lumOff val="25000"/>
                   </a:schemeClr>
                 </a:solidFill>
               </a:rPr>
@@ -3218,8 +3224,9 @@
             <a:r>
               <a:rPr lang="bg-BG" b="1" dirty="0" smtClean="0">
                 <a:solidFill>
-                  <a:schemeClr val="accent2">
+                  <a:schemeClr val="tx1">
                     <a:lumMod val="75000"/>
+                    <a:lumOff val="25000"/>
                   </a:schemeClr>
                 </a:solidFill>
               </a:rPr>
@@ -3230,8 +3237,9 @@
             <a:r>
               <a:rPr lang="bg-BG" b="1" dirty="0" smtClean="0">
                 <a:solidFill>
-                  <a:schemeClr val="accent2">
+                  <a:schemeClr val="tx1">
                     <a:lumMod val="75000"/>
+                    <a:lumOff val="25000"/>
                   </a:schemeClr>
                 </a:solidFill>
               </a:rPr>
@@ -3303,11 +3311,7 @@
             </a:br>
             <a:r>
               <a:rPr lang="en-US" dirty="0" smtClean="0"/>
-              <a:t>JS g</a:t>
-            </a:r>
-            <a:r>
-              <a:rPr lang="en-US" dirty="0" smtClean="0"/>
-              <a:t>ame</a:t>
+              <a:t>JS game</a:t>
             </a:r>
             <a:endParaRPr lang="en-US" dirty="0"/>
           </a:p>
@@ -3412,11 +3416,7 @@
           <a:p>
             <a:r>
               <a:rPr lang="en-US" dirty="0" smtClean="0"/>
-              <a:t>KineticJS for HTML5 </a:t>
-            </a:r>
-            <a:r>
-              <a:rPr lang="en-US" dirty="0" smtClean="0"/>
-              <a:t>Canvas</a:t>
+              <a:t>KineticJS for HTML5 Canvas</a:t>
             </a:r>
           </a:p>
           <a:p>
@@ -3428,7 +3428,6 @@
               <a:rPr lang="en-US" dirty="0" smtClean="0"/>
               <a:t>graphics</a:t>
             </a:r>
-            <a:endParaRPr lang="en-US" dirty="0" smtClean="0"/>
           </a:p>
           <a:p>
             <a:r>
@@ -3445,13 +3444,8 @@
           <a:p>
             <a:r>
               <a:rPr lang="en-US" dirty="0" smtClean="0"/>
-              <a:t>JS </a:t>
-            </a:r>
-            <a:r>
-              <a:rPr lang="en-US" dirty="0" smtClean="0"/>
-              <a:t>OOP</a:t>
-            </a:r>
-            <a:endParaRPr lang="en-US" dirty="0" smtClean="0"/>
+              <a:t>JS OOP</a:t>
+            </a:r>
           </a:p>
         </p:txBody>
       </p:sp>
@@ -3459,6 +3453,73 @@
     <p:extLst>
       <p:ext uri="{BB962C8B-B14F-4D97-AF65-F5344CB8AC3E}">
         <p14:creationId xmlns:p14="http://schemas.microsoft.com/office/powerpoint/2010/main" val="2431285014"/>
+      </p:ext>
+    </p:extLst>
+  </p:cSld>
+  <p:clrMapOvr>
+    <a:masterClrMapping/>
+  </p:clrMapOvr>
+</p:sld>
+</file>
+
+<file path=ppt/slides/slide4.xml><?xml version="1.0" encoding="utf-8"?>
+<p:sld xmlns:a="http://schemas.openxmlformats.org/drawingml/2006/main" xmlns:r="http://schemas.openxmlformats.org/officeDocument/2006/relationships" xmlns:p="http://schemas.openxmlformats.org/presentationml/2006/main">
+  <p:cSld>
+    <p:spTree>
+      <p:nvGrpSpPr>
+        <p:cNvPr id="1" name=""/>
+        <p:cNvGrpSpPr/>
+        <p:nvPr/>
+      </p:nvGrpSpPr>
+      <p:grpSpPr>
+        <a:xfrm>
+          <a:off x="0" y="0"/>
+          <a:ext cx="0" cy="0"/>
+          <a:chOff x="0" y="0"/>
+          <a:chExt cx="0" cy="0"/>
+        </a:xfrm>
+      </p:grpSpPr>
+      <p:sp>
+        <p:nvSpPr>
+          <p:cNvPr id="2" name="Title 1"/>
+          <p:cNvSpPr>
+            <a:spLocks noGrp="1"/>
+          </p:cNvSpPr>
+          <p:nvPr>
+            <p:ph type="title"/>
+          </p:nvPr>
+        </p:nvSpPr>
+        <p:spPr>
+          <a:xfrm>
+            <a:off x="467544" y="2708920"/>
+            <a:ext cx="8229600" cy="1503040"/>
+          </a:xfrm>
+        </p:spPr>
+        <p:txBody>
+          <a:bodyPr>
+            <a:normAutofit fontScale="90000"/>
+          </a:bodyPr>
+          <a:lstStyle/>
+          <a:p>
+            <a:r>
+              <a:rPr lang="en-US" sz="8900" dirty="0"/>
+              <a:t>Thank You!</a:t>
+            </a:r>
+            <a:r>
+              <a:rPr lang="en-US" dirty="0"/>
+              <a:t/>
+            </a:r>
+            <a:br>
+              <a:rPr lang="en-US" dirty="0"/>
+            </a:br>
+            <a:endParaRPr lang="en-US" dirty="0"/>
+          </a:p>
+        </p:txBody>
+      </p:sp>
+    </p:spTree>
+    <p:extLst>
+      <p:ext uri="{BB962C8B-B14F-4D97-AF65-F5344CB8AC3E}">
+        <p14:creationId xmlns:p14="http://schemas.microsoft.com/office/powerpoint/2010/main" val="1843261940"/>
       </p:ext>
     </p:extLst>
   </p:cSld>

</xml_diff>